<commit_message>
added chapter 11 slides
</commit_message>
<xml_diff>
--- a/chap03.pptx
+++ b/chap03.pptx
@@ -5,7 +5,7 @@
     <p:sldMasterId id="2147483648" r:id="rId1"/>
   </p:sldMasterIdLst>
   <p:notesMasterIdLst>
-    <p:notesMasterId r:id="rId57"/>
+    <p:notesMasterId r:id="rId58"/>
   </p:notesMasterIdLst>
   <p:sldIdLst>
     <p:sldId id="256" r:id="rId2"/>
@@ -63,6 +63,7 @@
     <p:sldId id="399" r:id="rId54"/>
     <p:sldId id="411" r:id="rId55"/>
     <p:sldId id="412" r:id="rId56"/>
+    <p:sldId id="362" r:id="rId57"/>
   </p:sldIdLst>
   <p:sldSz cx="12192000" cy="6858000"/>
   <p:notesSz cx="6858000" cy="9144000"/>
@@ -251,7 +252,7 @@
           <a:p>
             <a:fld id="{F22450E9-715D-42D8-9747-C0402EEB663B}" type="datetimeFigureOut">
               <a:rPr lang="en-US" smtClean="0"/>
-              <a:t>5/29/21</a:t>
+              <a:t>6/21/21</a:t>
             </a:fld>
             <a:endParaRPr lang="en-US"/>
           </a:p>
@@ -3783,7 +3784,7 @@
           <a:p>
             <a:fld id="{59E6F902-31B0-C749-B955-5A3E4D8260BA}" type="datetime1">
               <a:rPr lang="en-US" smtClean="0"/>
-              <a:t>5/29/21</a:t>
+              <a:t>6/21/21</a:t>
             </a:fld>
             <a:endParaRPr lang="en-US"/>
           </a:p>
@@ -3955,7 +3956,7 @@
           <a:p>
             <a:fld id="{9FF23D98-3510-7245-86CD-59E60D1657F9}" type="datetime1">
               <a:rPr lang="en-US" smtClean="0"/>
-              <a:t>5/29/21</a:t>
+              <a:t>6/21/21</a:t>
             </a:fld>
             <a:endParaRPr lang="en-US"/>
           </a:p>
@@ -4219,7 +4220,7 @@
           <a:p>
             <a:fld id="{3EAFC5AE-625B-5448-A323-7375037ACA0A}" type="datetime1">
               <a:rPr lang="en-US" smtClean="0"/>
-              <a:t>5/29/21</a:t>
+              <a:t>6/21/21</a:t>
             </a:fld>
             <a:endParaRPr lang="en-US"/>
           </a:p>
@@ -4616,7 +4617,7 @@
           <a:p>
             <a:fld id="{4D7DC098-65A3-4C4E-B095-AF27D03BB041}" type="datetime1">
               <a:rPr lang="en-US" smtClean="0"/>
-              <a:t>5/29/21</a:t>
+              <a:t>6/21/21</a:t>
             </a:fld>
             <a:endParaRPr lang="en-US"/>
           </a:p>
@@ -5035,7 +5036,7 @@
           <a:p>
             <a:fld id="{47690363-2B5E-EF47-A323-2A6A6AC3C0A6}" type="datetime1">
               <a:rPr lang="en-US" smtClean="0"/>
-              <a:t>5/29/21</a:t>
+              <a:t>6/21/21</a:t>
             </a:fld>
             <a:endParaRPr lang="en-US"/>
           </a:p>
@@ -5207,7 +5208,7 @@
           <a:p>
             <a:fld id="{48BCE32E-CD4C-2645-AF16-A48AEDD1FD4A}" type="datetime1">
               <a:rPr lang="en-US" smtClean="0"/>
-              <a:t>5/29/21</a:t>
+              <a:t>6/21/21</a:t>
             </a:fld>
             <a:endParaRPr lang="en-US"/>
           </a:p>
@@ -5357,7 +5358,7 @@
           <a:p>
             <a:fld id="{4AE1833B-C2DE-EF47-B853-9071570580B9}" type="datetime1">
               <a:rPr lang="en-US" smtClean="0"/>
-              <a:t>5/29/21</a:t>
+              <a:t>6/21/21</a:t>
             </a:fld>
             <a:endParaRPr lang="en-US"/>
           </a:p>
@@ -5687,7 +5688,7 @@
           <a:p>
             <a:fld id="{C7F1707C-5FA0-3C4B-BD19-4F2693455920}" type="datetime1">
               <a:rPr lang="en-US" smtClean="0"/>
-              <a:t>5/29/21</a:t>
+              <a:t>6/21/21</a:t>
             </a:fld>
             <a:endParaRPr lang="en-US"/>
           </a:p>
@@ -5994,7 +5995,7 @@
           <a:p>
             <a:fld id="{7C5F269E-5328-244F-B514-1780FC037411}" type="datetime1">
               <a:rPr lang="en-US" smtClean="0"/>
-              <a:t>5/29/21</a:t>
+              <a:t>6/21/21</a:t>
             </a:fld>
             <a:endParaRPr lang="en-US"/>
           </a:p>
@@ -6449,7 +6450,7 @@
           <a:p>
             <a:fld id="{46C38DEB-2EDB-D742-8978-732BE86CF6BF}" type="datetime1">
               <a:rPr lang="en-US" smtClean="0"/>
-              <a:t>5/29/21</a:t>
+              <a:t>6/21/21</a:t>
             </a:fld>
             <a:endParaRPr lang="en-US"/>
           </a:p>
@@ -54901,6 +54902,234 @@
 </p:sld>
 </file>
 
+<file path=ppt/slides/slide56.xml><?xml version="1.0" encoding="utf-8"?>
+<p:sld xmlns:a="http://schemas.openxmlformats.org/drawingml/2006/main" xmlns:r="http://schemas.openxmlformats.org/officeDocument/2006/relationships" xmlns:p="http://schemas.openxmlformats.org/presentationml/2006/main">
+  <p:cSld>
+    <p:spTree>
+      <p:nvGrpSpPr>
+        <p:cNvPr id="1" name=""/>
+        <p:cNvGrpSpPr/>
+        <p:nvPr/>
+      </p:nvGrpSpPr>
+      <p:grpSpPr>
+        <a:xfrm>
+          <a:off x="0" y="0"/>
+          <a:ext cx="0" cy="0"/>
+          <a:chOff x="0" y="0"/>
+          <a:chExt cx="0" cy="0"/>
+        </a:xfrm>
+      </p:grpSpPr>
+      <p:sp>
+        <p:nvSpPr>
+          <p:cNvPr id="8" name="Title 7">
+            <a:extLst>
+              <a:ext uri="{FF2B5EF4-FFF2-40B4-BE49-F238E27FC236}">
+                <a16:creationId xmlns:a16="http://schemas.microsoft.com/office/drawing/2014/main" id="{C30BA685-E4B7-FD4F-BBC6-2E73C247794D}"/>
+              </a:ext>
+            </a:extLst>
+          </p:cNvPr>
+          <p:cNvSpPr>
+            <a:spLocks noGrp="1"/>
+          </p:cNvSpPr>
+          <p:nvPr>
+            <p:ph type="title"/>
+          </p:nvPr>
+        </p:nvSpPr>
+        <p:spPr/>
+        <p:txBody>
+          <a:bodyPr/>
+          <a:lstStyle/>
+          <a:p>
+            <a:endParaRPr lang="en-US"/>
+          </a:p>
+        </p:txBody>
+      </p:sp>
+      <p:sp>
+        <p:nvSpPr>
+          <p:cNvPr id="5" name="Footer Placeholder 4">
+            <a:extLst>
+              <a:ext uri="{FF2B5EF4-FFF2-40B4-BE49-F238E27FC236}">
+                <a16:creationId xmlns:a16="http://schemas.microsoft.com/office/drawing/2014/main" id="{40D81244-1055-6C40-BF44-EB29BE68AB51}"/>
+              </a:ext>
+            </a:extLst>
+          </p:cNvPr>
+          <p:cNvSpPr>
+            <a:spLocks noGrp="1"/>
+          </p:cNvSpPr>
+          <p:nvPr>
+            <p:ph type="ftr" sz="quarter" idx="11"/>
+          </p:nvPr>
+        </p:nvSpPr>
+        <p:spPr/>
+        <p:txBody>
+          <a:bodyPr/>
+          <a:lstStyle/>
+          <a:p>
+            <a:r>
+              <a:rPr lang="en-US"/>
+              <a:t>Programming at the Hardware/Software Interface</a:t>
+            </a:r>
+            <a:endParaRPr lang="en-US" dirty="0"/>
+          </a:p>
+        </p:txBody>
+      </p:sp>
+      <p:sp>
+        <p:nvSpPr>
+          <p:cNvPr id="6" name="Slide Number Placeholder 5">
+            <a:extLst>
+              <a:ext uri="{FF2B5EF4-FFF2-40B4-BE49-F238E27FC236}">
+                <a16:creationId xmlns:a16="http://schemas.microsoft.com/office/drawing/2014/main" id="{F1E0179C-80EE-6743-A171-1D776EA7FFA5}"/>
+              </a:ext>
+            </a:extLst>
+          </p:cNvPr>
+          <p:cNvSpPr>
+            <a:spLocks noGrp="1"/>
+          </p:cNvSpPr>
+          <p:nvPr>
+            <p:ph type="sldNum" sz="quarter" idx="12"/>
+          </p:nvPr>
+        </p:nvSpPr>
+        <p:spPr/>
+        <p:txBody>
+          <a:bodyPr/>
+          <a:lstStyle/>
+          <a:p>
+            <a:fld id="{B30C84D9-7A41-4FEB-892B-80917372DB87}" type="slidenum">
+              <a:rPr lang="en-US" smtClean="0"/>
+              <a:t>56</a:t>
+            </a:fld>
+            <a:endParaRPr lang="en-US"/>
+          </a:p>
+        </p:txBody>
+      </p:sp>
+      <p:sp>
+        <p:nvSpPr>
+          <p:cNvPr id="7" name="Text Placeholder 6">
+            <a:extLst>
+              <a:ext uri="{FF2B5EF4-FFF2-40B4-BE49-F238E27FC236}">
+                <a16:creationId xmlns:a16="http://schemas.microsoft.com/office/drawing/2014/main" id="{9389A839-9030-3248-8503-8C55FDB1E312}"/>
+              </a:ext>
+            </a:extLst>
+          </p:cNvPr>
+          <p:cNvSpPr>
+            <a:spLocks noGrp="1"/>
+          </p:cNvSpPr>
+          <p:nvPr>
+            <p:ph type="body" sz="quarter" idx="13"/>
+          </p:nvPr>
+        </p:nvSpPr>
+        <p:spPr/>
+        <p:txBody>
+          <a:bodyPr/>
+          <a:lstStyle/>
+          <a:p>
+            <a:r>
+              <a:rPr lang="en-US" dirty="0"/>
+              <a:t>Slide by Bohn</a:t>
+            </a:r>
+          </a:p>
+        </p:txBody>
+      </p:sp>
+      <p:sp>
+        <p:nvSpPr>
+          <p:cNvPr id="11" name="TextBox 10">
+            <a:extLst>
+              <a:ext uri="{FF2B5EF4-FFF2-40B4-BE49-F238E27FC236}">
+                <a16:creationId xmlns:a16="http://schemas.microsoft.com/office/drawing/2014/main" id="{311B1E2E-CBAB-DB4B-88AB-5232C0772C17}"/>
+              </a:ext>
+            </a:extLst>
+          </p:cNvPr>
+          <p:cNvSpPr txBox="1"/>
+          <p:nvPr/>
+        </p:nvSpPr>
+        <p:spPr>
+          <a:xfrm>
+            <a:off x="8987027" y="5624513"/>
+            <a:ext cx="2315634" cy="369332"/>
+          </a:xfrm>
+          <a:prstGeom prst="rect">
+            <a:avLst/>
+          </a:prstGeom>
+          <a:noFill/>
+        </p:spPr>
+        <p:txBody>
+          <a:bodyPr wrap="none" rtlCol="0">
+            <a:spAutoFit/>
+          </a:bodyPr>
+          <a:lstStyle/>
+          <a:p>
+            <a:r>
+              <a:rPr lang="en-US" dirty="0">
+                <a:hlinkClick r:id="rId2"/>
+              </a:rPr>
+              <a:t>https://xkcd.com/571/</a:t>
+            </a:r>
+            <a:endParaRPr lang="en-US" dirty="0"/>
+          </a:p>
+        </p:txBody>
+      </p:sp>
+      <p:pic>
+        <p:nvPicPr>
+          <p:cNvPr id="1026" name="Picture 2" descr="Can't Sleep">
+            <a:extLst>
+              <a:ext uri="{FF2B5EF4-FFF2-40B4-BE49-F238E27FC236}">
+                <a16:creationId xmlns:a16="http://schemas.microsoft.com/office/drawing/2014/main" id="{2B997B38-F4A0-9843-9C80-2F9DD394C92F}"/>
+              </a:ext>
+            </a:extLst>
+          </p:cNvPr>
+          <p:cNvPicPr>
+            <a:picLocks noGrp="1" noChangeAspect="1" noChangeArrowheads="1"/>
+          </p:cNvPicPr>
+          <p:nvPr>
+            <p:ph idx="1"/>
+          </p:nvPr>
+        </p:nvPicPr>
+        <p:blipFill>
+          <a:blip r:embed="rId3">
+            <a:extLst>
+              <a:ext uri="{28A0092B-C50C-407E-A947-70E740481C1C}">
+                <a14:useLocalDpi xmlns:a14="http://schemas.microsoft.com/office/drawing/2010/main" val="0"/>
+              </a:ext>
+            </a:extLst>
+          </a:blip>
+          <a:srcRect/>
+          <a:stretch>
+            <a:fillRect/>
+          </a:stretch>
+        </p:blipFill>
+        <p:spPr bwMode="auto">
+          <a:xfrm>
+            <a:off x="889339" y="2286619"/>
+            <a:ext cx="10413322" cy="3429350"/>
+          </a:xfrm>
+          <a:prstGeom prst="rect">
+            <a:avLst/>
+          </a:prstGeom>
+          <a:noFill/>
+          <a:extLst>
+            <a:ext uri="{909E8E84-426E-40DD-AFC4-6F175D3DCCD1}">
+              <a14:hiddenFill xmlns:a14="http://schemas.microsoft.com/office/drawing/2010/main">
+                <a:solidFill>
+                  <a:srgbClr val="FFFFFF"/>
+                </a:solidFill>
+              </a14:hiddenFill>
+            </a:ext>
+          </a:extLst>
+        </p:spPr>
+      </p:pic>
+    </p:spTree>
+    <p:extLst>
+      <p:ext uri="{BB962C8B-B14F-4D97-AF65-F5344CB8AC3E}">
+        <p14:creationId xmlns:p14="http://schemas.microsoft.com/office/powerpoint/2010/main" val="3772481851"/>
+      </p:ext>
+    </p:extLst>
+  </p:cSld>
+  <p:clrMapOvr>
+    <a:masterClrMapping/>
+  </p:clrMapOvr>
+</p:sld>
+</file>
+
 <file path=ppt/slides/slide6.xml><?xml version="1.0" encoding="utf-8"?>
 <p:sld xmlns:a="http://schemas.openxmlformats.org/drawingml/2006/main" xmlns:r="http://schemas.openxmlformats.org/officeDocument/2006/relationships" xmlns:p="http://schemas.openxmlformats.org/presentationml/2006/main">
   <p:cSld>

</xml_diff>

<commit_message>
added worked examples for chapters 2-3
</commit_message>
<xml_diff>
--- a/chap03.pptx
+++ b/chap03.pptx
@@ -252,7 +252,7 @@
           <a:p>
             <a:fld id="{F22450E9-715D-42D8-9747-C0402EEB663B}" type="datetimeFigureOut">
               <a:rPr lang="en-US" smtClean="0"/>
-              <a:t>9/19/21</a:t>
+              <a:t>1/5/22</a:t>
             </a:fld>
             <a:endParaRPr lang="en-US"/>
           </a:p>
@@ -3784,7 +3784,7 @@
           <a:p>
             <a:fld id="{59E6F902-31B0-C749-B955-5A3E4D8260BA}" type="datetime1">
               <a:rPr lang="en-US" smtClean="0"/>
-              <a:t>9/19/21</a:t>
+              <a:t>1/5/22</a:t>
             </a:fld>
             <a:endParaRPr lang="en-US"/>
           </a:p>
@@ -3956,7 +3956,7 @@
           <a:p>
             <a:fld id="{9FF23D98-3510-7245-86CD-59E60D1657F9}" type="datetime1">
               <a:rPr lang="en-US" smtClean="0"/>
-              <a:t>9/19/21</a:t>
+              <a:t>1/5/22</a:t>
             </a:fld>
             <a:endParaRPr lang="en-US"/>
           </a:p>
@@ -4220,7 +4220,7 @@
           <a:p>
             <a:fld id="{3EAFC5AE-625B-5448-A323-7375037ACA0A}" type="datetime1">
               <a:rPr lang="en-US" smtClean="0"/>
-              <a:t>9/19/21</a:t>
+              <a:t>1/5/22</a:t>
             </a:fld>
             <a:endParaRPr lang="en-US"/>
           </a:p>
@@ -4617,7 +4617,7 @@
           <a:p>
             <a:fld id="{4D7DC098-65A3-4C4E-B095-AF27D03BB041}" type="datetime1">
               <a:rPr lang="en-US" smtClean="0"/>
-              <a:t>9/19/21</a:t>
+              <a:t>1/5/22</a:t>
             </a:fld>
             <a:endParaRPr lang="en-US"/>
           </a:p>
@@ -5036,7 +5036,7 @@
           <a:p>
             <a:fld id="{47690363-2B5E-EF47-A323-2A6A6AC3C0A6}" type="datetime1">
               <a:rPr lang="en-US" smtClean="0"/>
-              <a:t>9/19/21</a:t>
+              <a:t>1/5/22</a:t>
             </a:fld>
             <a:endParaRPr lang="en-US"/>
           </a:p>
@@ -5208,7 +5208,7 @@
           <a:p>
             <a:fld id="{48BCE32E-CD4C-2645-AF16-A48AEDD1FD4A}" type="datetime1">
               <a:rPr lang="en-US" smtClean="0"/>
-              <a:t>9/19/21</a:t>
+              <a:t>1/5/22</a:t>
             </a:fld>
             <a:endParaRPr lang="en-US"/>
           </a:p>
@@ -5358,7 +5358,7 @@
           <a:p>
             <a:fld id="{4AE1833B-C2DE-EF47-B853-9071570580B9}" type="datetime1">
               <a:rPr lang="en-US" smtClean="0"/>
-              <a:t>9/19/21</a:t>
+              <a:t>1/5/22</a:t>
             </a:fld>
             <a:endParaRPr lang="en-US"/>
           </a:p>
@@ -5688,7 +5688,7 @@
           <a:p>
             <a:fld id="{C7F1707C-5FA0-3C4B-BD19-4F2693455920}" type="datetime1">
               <a:rPr lang="en-US" smtClean="0"/>
-              <a:t>9/19/21</a:t>
+              <a:t>1/5/22</a:t>
             </a:fld>
             <a:endParaRPr lang="en-US"/>
           </a:p>
@@ -5995,7 +5995,7 @@
           <a:p>
             <a:fld id="{7C5F269E-5328-244F-B514-1780FC037411}" type="datetime1">
               <a:rPr lang="en-US" smtClean="0"/>
-              <a:t>9/19/21</a:t>
+              <a:t>1/5/22</a:t>
             </a:fld>
             <a:endParaRPr lang="en-US"/>
           </a:p>
@@ -6450,7 +6450,7 @@
           <a:p>
             <a:fld id="{46C38DEB-2EDB-D742-8978-732BE86CF6BF}" type="datetime1">
               <a:rPr lang="en-US" smtClean="0"/>
-              <a:t>9/19/21</a:t>
+              <a:t>1/5/22</a:t>
             </a:fld>
             <a:endParaRPr lang="en-US"/>
           </a:p>
@@ -51737,6 +51737,11 @@
               <a:rPr lang="en-US" dirty="0"/>
               <a:t> * 100…00</a:t>
             </a:r>
+            <a:r>
+              <a:rPr lang="en-US" baseline="-25000" dirty="0"/>
+              <a:t>2</a:t>
+            </a:r>
+            <a:endParaRPr lang="en-US" dirty="0"/>
           </a:p>
           <a:p>
             <a:endParaRPr lang="en-US" i="1" dirty="0"/>

</xml_diff>

<commit_message>
Tweaked slides, added missing graphics for worked examples
</commit_message>
<xml_diff>
--- a/chap03.pptx
+++ b/chap03.pptx
@@ -252,7 +252,7 @@
           <a:p>
             <a:fld id="{F22450E9-715D-42D8-9747-C0402EEB663B}" type="datetimeFigureOut">
               <a:rPr lang="en-US" smtClean="0"/>
-              <a:t>1/5/22</a:t>
+              <a:t>9/9/22</a:t>
             </a:fld>
             <a:endParaRPr lang="en-US"/>
           </a:p>
@@ -3784,7 +3784,7 @@
           <a:p>
             <a:fld id="{59E6F902-31B0-C749-B955-5A3E4D8260BA}" type="datetime1">
               <a:rPr lang="en-US" smtClean="0"/>
-              <a:t>1/5/22</a:t>
+              <a:t>9/9/22</a:t>
             </a:fld>
             <a:endParaRPr lang="en-US"/>
           </a:p>
@@ -3956,7 +3956,7 @@
           <a:p>
             <a:fld id="{9FF23D98-3510-7245-86CD-59E60D1657F9}" type="datetime1">
               <a:rPr lang="en-US" smtClean="0"/>
-              <a:t>1/5/22</a:t>
+              <a:t>9/9/22</a:t>
             </a:fld>
             <a:endParaRPr lang="en-US"/>
           </a:p>
@@ -4220,7 +4220,7 @@
           <a:p>
             <a:fld id="{3EAFC5AE-625B-5448-A323-7375037ACA0A}" type="datetime1">
               <a:rPr lang="en-US" smtClean="0"/>
-              <a:t>1/5/22</a:t>
+              <a:t>9/9/22</a:t>
             </a:fld>
             <a:endParaRPr lang="en-US"/>
           </a:p>
@@ -4617,7 +4617,7 @@
           <a:p>
             <a:fld id="{4D7DC098-65A3-4C4E-B095-AF27D03BB041}" type="datetime1">
               <a:rPr lang="en-US" smtClean="0"/>
-              <a:t>1/5/22</a:t>
+              <a:t>9/9/22</a:t>
             </a:fld>
             <a:endParaRPr lang="en-US"/>
           </a:p>
@@ -5036,7 +5036,7 @@
           <a:p>
             <a:fld id="{47690363-2B5E-EF47-A323-2A6A6AC3C0A6}" type="datetime1">
               <a:rPr lang="en-US" smtClean="0"/>
-              <a:t>1/5/22</a:t>
+              <a:t>9/9/22</a:t>
             </a:fld>
             <a:endParaRPr lang="en-US"/>
           </a:p>
@@ -5208,7 +5208,7 @@
           <a:p>
             <a:fld id="{48BCE32E-CD4C-2645-AF16-A48AEDD1FD4A}" type="datetime1">
               <a:rPr lang="en-US" smtClean="0"/>
-              <a:t>1/5/22</a:t>
+              <a:t>9/9/22</a:t>
             </a:fld>
             <a:endParaRPr lang="en-US"/>
           </a:p>
@@ -5358,7 +5358,7 @@
           <a:p>
             <a:fld id="{4AE1833B-C2DE-EF47-B853-9071570580B9}" type="datetime1">
               <a:rPr lang="en-US" smtClean="0"/>
-              <a:t>1/5/22</a:t>
+              <a:t>9/9/22</a:t>
             </a:fld>
             <a:endParaRPr lang="en-US"/>
           </a:p>
@@ -5688,7 +5688,7 @@
           <a:p>
             <a:fld id="{C7F1707C-5FA0-3C4B-BD19-4F2693455920}" type="datetime1">
               <a:rPr lang="en-US" smtClean="0"/>
-              <a:t>1/5/22</a:t>
+              <a:t>9/9/22</a:t>
             </a:fld>
             <a:endParaRPr lang="en-US"/>
           </a:p>
@@ -5995,7 +5995,7 @@
           <a:p>
             <a:fld id="{7C5F269E-5328-244F-B514-1780FC037411}" type="datetime1">
               <a:rPr lang="en-US" smtClean="0"/>
-              <a:t>1/5/22</a:t>
+              <a:t>9/9/22</a:t>
             </a:fld>
             <a:endParaRPr lang="en-US"/>
           </a:p>
@@ -6450,7 +6450,7 @@
           <a:p>
             <a:fld id="{46C38DEB-2EDB-D742-8978-732BE86CF6BF}" type="datetime1">
               <a:rPr lang="en-US" smtClean="0"/>
-              <a:t>1/5/22</a:t>
+              <a:t>9/9/22</a:t>
             </a:fld>
             <a:endParaRPr lang="en-US"/>
           </a:p>
@@ -18093,7 +18093,7 @@
           <p:nvPr>
             <p:extLst>
               <p:ext uri="{D42A27DB-BD31-4B8C-83A1-F6EECF244321}">
-                <p14:modId xmlns:p14="http://schemas.microsoft.com/office/powerpoint/2010/main" val="1152920267"/>
+                <p14:modId xmlns:p14="http://schemas.microsoft.com/office/powerpoint/2010/main" val="2175474408"/>
               </p:ext>
             </p:extLst>
           </p:nvPr>
@@ -18298,7 +18298,7 @@
                       <a:pPr algn="r"/>
                       <a:r>
                         <a:rPr lang="en-US" dirty="0"/>
-                        <a:t>1111 1111 1111 0101</a:t>
+                        <a:t>1111 1111 0001 1001</a:t>
                       </a:r>
                     </a:p>
                   </a:txBody>
@@ -18377,7 +18377,7 @@
                       </a:pPr>
                       <a:r>
                         <a:rPr lang="en-US" dirty="0"/>
-                        <a:t>1111 1111 1111 1111 1111 1111 1111 0101</a:t>
+                        <a:t>1111 1111 1111 1111 1111 1111 0001 1001</a:t>
                       </a:r>
                     </a:p>
                   </a:txBody>
@@ -18456,7 +18456,7 @@
                       </a:pPr>
                       <a:r>
                         <a:rPr lang="en-US" sz="1000" dirty="0"/>
-                        <a:t>1111 1111 1111 1111 1111 1111 1111 1111 1111 1111 1111 1111 1111 1111 1111 0101</a:t>
+                        <a:t>1111 1111 1111 1111 1111 1111 1111 1111 1111 1111 1111 1111 1111 1111 0001 1001</a:t>
                       </a:r>
                     </a:p>
                   </a:txBody>
@@ -45020,7 +45020,7 @@
             <a:pPr lvl="1"/>
             <a:r>
               <a:rPr lang="en-US" dirty="0"/>
-              <a:t>a == 53</a:t>
+              <a:t>53</a:t>
             </a:r>
             <a:r>
               <a:rPr lang="en-US" baseline="-25000" dirty="0"/>
@@ -45028,11 +45028,23 @@
             </a:r>
             <a:r>
               <a:rPr lang="en-US" dirty="0"/>
-              <a:t> == 0x35</a:t>
-            </a:r>
-            <a:br>
-              <a:rPr lang="en-US" dirty="0"/>
-            </a:br>
+              <a:t> == 0x00000035</a:t>
+            </a:r>
+          </a:p>
+          <a:p>
+            <a:pPr lvl="1"/>
+            <a:r>
+              <a:rPr lang="en-US" dirty="0"/>
+              <a:t>a == 0x35 == 53</a:t>
+            </a:r>
+            <a:r>
+              <a:rPr lang="en-US" baseline="-25000" dirty="0"/>
+              <a:t>10</a:t>
+            </a:r>
+            <a:endParaRPr lang="en-US" dirty="0"/>
+          </a:p>
+          <a:p>
+            <a:pPr lvl="1"/>
             <a:r>
               <a:rPr lang="en-US" dirty="0"/>
               <a:t>s == 0x0035 == 53</a:t>
@@ -45142,6 +45154,192 @@
             <a:r>
               <a:rPr lang="en-US" dirty="0"/>
               <a:t>Slide by Bohn</a:t>
+            </a:r>
+          </a:p>
+        </p:txBody>
+      </p:sp>
+      <p:sp>
+        <p:nvSpPr>
+          <p:cNvPr id="3" name="Arc 2">
+            <a:extLst>
+              <a:ext uri="{FF2B5EF4-FFF2-40B4-BE49-F238E27FC236}">
+                <a16:creationId xmlns:a16="http://schemas.microsoft.com/office/drawing/2014/main" id="{9197EC9F-8DA0-1648-EB56-4F0FF6CD0D58}"/>
+              </a:ext>
+            </a:extLst>
+          </p:cNvPr>
+          <p:cNvSpPr/>
+          <p:nvPr/>
+        </p:nvSpPr>
+        <p:spPr>
+          <a:xfrm>
+            <a:off x="3810376" y="3194050"/>
+            <a:ext cx="456824" cy="412750"/>
+          </a:xfrm>
+          <a:prstGeom prst="arc">
+            <a:avLst>
+              <a:gd name="adj1" fmla="val 16200000"/>
+              <a:gd name="adj2" fmla="val 5201888"/>
+            </a:avLst>
+          </a:prstGeom>
+          <a:ln w="28575">
+            <a:solidFill>
+              <a:srgbClr val="FF0000"/>
+            </a:solidFill>
+            <a:headEnd type="none" w="med" len="med"/>
+            <a:tailEnd type="triangle" w="med" len="med"/>
+          </a:ln>
+        </p:spPr>
+        <p:style>
+          <a:lnRef idx="1">
+            <a:schemeClr val="accent1"/>
+          </a:lnRef>
+          <a:fillRef idx="0">
+            <a:schemeClr val="accent1"/>
+          </a:fillRef>
+          <a:effectRef idx="0">
+            <a:schemeClr val="accent1"/>
+          </a:effectRef>
+          <a:fontRef idx="minor">
+            <a:schemeClr val="tx1"/>
+          </a:fontRef>
+        </p:style>
+        <p:txBody>
+          <a:bodyPr rtlCol="0" anchor="ctr"/>
+          <a:lstStyle/>
+          <a:p>
+            <a:pPr algn="ctr"/>
+            <a:endParaRPr lang="en-US"/>
+          </a:p>
+        </p:txBody>
+      </p:sp>
+      <p:sp>
+        <p:nvSpPr>
+          <p:cNvPr id="4" name="TextBox 3">
+            <a:extLst>
+              <a:ext uri="{FF2B5EF4-FFF2-40B4-BE49-F238E27FC236}">
+                <a16:creationId xmlns:a16="http://schemas.microsoft.com/office/drawing/2014/main" id="{56C4A379-DC3F-8253-9BB8-69A20FD3CCA5}"/>
+              </a:ext>
+            </a:extLst>
+          </p:cNvPr>
+          <p:cNvSpPr txBox="1"/>
+          <p:nvPr/>
+        </p:nvSpPr>
+        <p:spPr>
+          <a:xfrm>
+            <a:off x="4267200" y="3244334"/>
+            <a:ext cx="7094443" cy="369332"/>
+          </a:xfrm>
+          <a:prstGeom prst="rect">
+            <a:avLst/>
+          </a:prstGeom>
+          <a:noFill/>
+        </p:spPr>
+        <p:txBody>
+          <a:bodyPr wrap="none" rtlCol="0">
+            <a:spAutoFit/>
+          </a:bodyPr>
+          <a:lstStyle/>
+          <a:p>
+            <a:r>
+              <a:rPr lang="en-US" dirty="0">
+                <a:solidFill>
+                  <a:srgbClr val="FF0000"/>
+                </a:solidFill>
+              </a:rPr>
+              <a:t>Upper 3 bytes of 4-byte signed int truncated to fit in 1-byte unsigned char</a:t>
+            </a:r>
+          </a:p>
+        </p:txBody>
+      </p:sp>
+      <p:sp>
+        <p:nvSpPr>
+          <p:cNvPr id="9" name="Arc 8">
+            <a:extLst>
+              <a:ext uri="{FF2B5EF4-FFF2-40B4-BE49-F238E27FC236}">
+                <a16:creationId xmlns:a16="http://schemas.microsoft.com/office/drawing/2014/main" id="{5A537997-3E7A-3E58-78D8-81F47A282E78}"/>
+              </a:ext>
+            </a:extLst>
+          </p:cNvPr>
+          <p:cNvSpPr/>
+          <p:nvPr/>
+        </p:nvSpPr>
+        <p:spPr>
+          <a:xfrm>
+            <a:off x="3810376" y="3613666"/>
+            <a:ext cx="456824" cy="412750"/>
+          </a:xfrm>
+          <a:prstGeom prst="arc">
+            <a:avLst>
+              <a:gd name="adj1" fmla="val 16200000"/>
+              <a:gd name="adj2" fmla="val 5201888"/>
+            </a:avLst>
+          </a:prstGeom>
+          <a:ln w="28575">
+            <a:solidFill>
+              <a:srgbClr val="FF0000"/>
+            </a:solidFill>
+            <a:headEnd type="none" w="med" len="med"/>
+            <a:tailEnd type="triangle" w="med" len="med"/>
+          </a:ln>
+        </p:spPr>
+        <p:style>
+          <a:lnRef idx="1">
+            <a:schemeClr val="accent1"/>
+          </a:lnRef>
+          <a:fillRef idx="0">
+            <a:schemeClr val="accent1"/>
+          </a:fillRef>
+          <a:effectRef idx="0">
+            <a:schemeClr val="accent1"/>
+          </a:effectRef>
+          <a:fontRef idx="minor">
+            <a:schemeClr val="tx1"/>
+          </a:fontRef>
+        </p:style>
+        <p:txBody>
+          <a:bodyPr rtlCol="0" anchor="ctr"/>
+          <a:lstStyle/>
+          <a:p>
+            <a:pPr algn="ctr"/>
+            <a:endParaRPr lang="en-US"/>
+          </a:p>
+        </p:txBody>
+      </p:sp>
+      <p:sp>
+        <p:nvSpPr>
+          <p:cNvPr id="10" name="TextBox 9">
+            <a:extLst>
+              <a:ext uri="{FF2B5EF4-FFF2-40B4-BE49-F238E27FC236}">
+                <a16:creationId xmlns:a16="http://schemas.microsoft.com/office/drawing/2014/main" id="{AE4E8EAD-B99B-EE0A-624D-D6919123962D}"/>
+              </a:ext>
+            </a:extLst>
+          </p:cNvPr>
+          <p:cNvSpPr txBox="1"/>
+          <p:nvPr/>
+        </p:nvSpPr>
+        <p:spPr>
+          <a:xfrm>
+            <a:off x="4267200" y="3663950"/>
+            <a:ext cx="4247125" cy="369332"/>
+          </a:xfrm>
+          <a:prstGeom prst="rect">
+            <a:avLst/>
+          </a:prstGeom>
+          <a:noFill/>
+        </p:spPr>
+        <p:txBody>
+          <a:bodyPr wrap="none" rtlCol="0">
+            <a:spAutoFit/>
+          </a:bodyPr>
+          <a:lstStyle/>
+          <a:p>
+            <a:r>
+              <a:rPr lang="en-US" dirty="0">
+                <a:solidFill>
+                  <a:srgbClr val="FF0000"/>
+                </a:solidFill>
+              </a:rPr>
+              <a:t>Zero-extended to fill 2-byte unsigned short </a:t>
             </a:r>
           </a:p>
         </p:txBody>
@@ -45308,33 +45506,58 @@
                                   </p:childTnLst>
                                 </p:cTn>
                               </p:par>
-                            </p:childTnLst>
-                          </p:cTn>
-                        </p:par>
-                      </p:childTnLst>
-                    </p:cTn>
-                  </p:par>
-                  <p:par>
-                    <p:cTn id="14" fill="hold">
-                      <p:stCondLst>
-                        <p:cond delay="indefinite"/>
-                      </p:stCondLst>
-                      <p:childTnLst>
-                        <p:par>
-                          <p:cTn id="15" fill="hold">
-                            <p:stCondLst>
-                              <p:cond delay="0"/>
-                            </p:stCondLst>
-                            <p:childTnLst>
                               <p:par>
-                                <p:cTn id="16" presetID="9" presetClass="entr" presetSubtype="0" fill="hold" grpId="0" nodeType="clickEffect">
+                                <p:cTn id="14" presetID="9" presetClass="entr" presetSubtype="0" fill="hold" grpId="0" nodeType="withEffect">
                                   <p:stCondLst>
                                     <p:cond delay="0"/>
                                   </p:stCondLst>
                                   <p:childTnLst>
                                     <p:set>
                                       <p:cBhvr>
-                                        <p:cTn id="17" dur="1" fill="hold">
+                                        <p:cTn id="15" dur="1" fill="hold">
+                                          <p:stCondLst>
+                                            <p:cond delay="0"/>
+                                          </p:stCondLst>
+                                        </p:cTn>
+                                        <p:tgtEl>
+                                          <p:spTgt spid="8">
+                                            <p:txEl>
+                                              <p:pRg st="3" end="3"/>
+                                            </p:txEl>
+                                          </p:spTgt>
+                                        </p:tgtEl>
+                                        <p:attrNameLst>
+                                          <p:attrName>style.visibility</p:attrName>
+                                        </p:attrNameLst>
+                                      </p:cBhvr>
+                                      <p:to>
+                                        <p:strVal val="visible"/>
+                                      </p:to>
+                                    </p:set>
+                                    <p:animEffect transition="in" filter="dissolve">
+                                      <p:cBhvr>
+                                        <p:cTn id="16" dur="500"/>
+                                        <p:tgtEl>
+                                          <p:spTgt spid="8">
+                                            <p:txEl>
+                                              <p:pRg st="3" end="3"/>
+                                            </p:txEl>
+                                          </p:spTgt>
+                                        </p:tgtEl>
+                                      </p:cBhvr>
+                                    </p:animEffect>
+                                  </p:childTnLst>
+                                </p:cTn>
+                              </p:par>
+                              <p:par>
+                                <p:cTn id="17" presetID="9" presetClass="entr" presetSubtype="0" fill="hold" grpId="0" nodeType="withEffect">
+                                  <p:stCondLst>
+                                    <p:cond delay="0"/>
+                                  </p:stCondLst>
+                                  <p:childTnLst>
+                                    <p:set>
+                                      <p:cBhvr>
+                                        <p:cTn id="18" dur="1" fill="hold">
                                           <p:stCondLst>
                                             <p:cond delay="0"/>
                                           </p:stCondLst>
@@ -45356,7 +45579,7 @@
                                     </p:set>
                                     <p:animEffect transition="in" filter="dissolve">
                                       <p:cBhvr>
-                                        <p:cTn id="18" dur="500"/>
+                                        <p:cTn id="19" dur="500"/>
                                         <p:tgtEl>
                                           <p:spTgt spid="8">
                                             <p:txEl>
@@ -45369,15 +45592,209 @@
                                   </p:childTnLst>
                                 </p:cTn>
                               </p:par>
+                            </p:childTnLst>
+                          </p:cTn>
+                        </p:par>
+                      </p:childTnLst>
+                    </p:cTn>
+                  </p:par>
+                  <p:par>
+                    <p:cTn id="20" fill="hold">
+                      <p:stCondLst>
+                        <p:cond delay="indefinite"/>
+                      </p:stCondLst>
+                      <p:childTnLst>
+                        <p:par>
+                          <p:cTn id="21" fill="hold">
+                            <p:stCondLst>
+                              <p:cond delay="0"/>
+                            </p:stCondLst>
+                            <p:childTnLst>
                               <p:par>
-                                <p:cTn id="19" presetID="9" presetClass="entr" presetSubtype="0" fill="hold" grpId="0" nodeType="withEffect">
+                                <p:cTn id="22" presetID="22" presetClass="entr" presetSubtype="1" fill="hold" grpId="0" nodeType="clickEffect">
                                   <p:stCondLst>
                                     <p:cond delay="0"/>
                                   </p:stCondLst>
                                   <p:childTnLst>
                                     <p:set>
                                       <p:cBhvr>
-                                        <p:cTn id="20" dur="1" fill="hold">
+                                        <p:cTn id="23" dur="1" fill="hold">
+                                          <p:stCondLst>
+                                            <p:cond delay="0"/>
+                                          </p:stCondLst>
+                                        </p:cTn>
+                                        <p:tgtEl>
+                                          <p:spTgt spid="3"/>
+                                        </p:tgtEl>
+                                        <p:attrNameLst>
+                                          <p:attrName>style.visibility</p:attrName>
+                                        </p:attrNameLst>
+                                      </p:cBhvr>
+                                      <p:to>
+                                        <p:strVal val="visible"/>
+                                      </p:to>
+                                    </p:set>
+                                    <p:animEffect transition="in" filter="wipe(up)">
+                                      <p:cBhvr>
+                                        <p:cTn id="24" dur="500"/>
+                                        <p:tgtEl>
+                                          <p:spTgt spid="3"/>
+                                        </p:tgtEl>
+                                      </p:cBhvr>
+                                    </p:animEffect>
+                                  </p:childTnLst>
+                                </p:cTn>
+                              </p:par>
+                              <p:par>
+                                <p:cTn id="25" presetID="22" presetClass="entr" presetSubtype="1" fill="hold" grpId="0" nodeType="withEffect">
+                                  <p:stCondLst>
+                                    <p:cond delay="0"/>
+                                  </p:stCondLst>
+                                  <p:childTnLst>
+                                    <p:set>
+                                      <p:cBhvr>
+                                        <p:cTn id="26" dur="1" fill="hold">
+                                          <p:stCondLst>
+                                            <p:cond delay="0"/>
+                                          </p:stCondLst>
+                                        </p:cTn>
+                                        <p:tgtEl>
+                                          <p:spTgt spid="4"/>
+                                        </p:tgtEl>
+                                        <p:attrNameLst>
+                                          <p:attrName>style.visibility</p:attrName>
+                                        </p:attrNameLst>
+                                      </p:cBhvr>
+                                      <p:to>
+                                        <p:strVal val="visible"/>
+                                      </p:to>
+                                    </p:set>
+                                    <p:animEffect transition="in" filter="wipe(up)">
+                                      <p:cBhvr>
+                                        <p:cTn id="27" dur="500"/>
+                                        <p:tgtEl>
+                                          <p:spTgt spid="4"/>
+                                        </p:tgtEl>
+                                      </p:cBhvr>
+                                    </p:animEffect>
+                                  </p:childTnLst>
+                                </p:cTn>
+                              </p:par>
+                            </p:childTnLst>
+                          </p:cTn>
+                        </p:par>
+                      </p:childTnLst>
+                    </p:cTn>
+                  </p:par>
+                  <p:par>
+                    <p:cTn id="28" fill="hold">
+                      <p:stCondLst>
+                        <p:cond delay="indefinite"/>
+                      </p:stCondLst>
+                      <p:childTnLst>
+                        <p:par>
+                          <p:cTn id="29" fill="hold">
+                            <p:stCondLst>
+                              <p:cond delay="0"/>
+                            </p:stCondLst>
+                            <p:childTnLst>
+                              <p:par>
+                                <p:cTn id="30" presetID="22" presetClass="entr" presetSubtype="1" fill="hold" grpId="0" nodeType="clickEffect">
+                                  <p:stCondLst>
+                                    <p:cond delay="0"/>
+                                  </p:stCondLst>
+                                  <p:childTnLst>
+                                    <p:set>
+                                      <p:cBhvr>
+                                        <p:cTn id="31" dur="1" fill="hold">
+                                          <p:stCondLst>
+                                            <p:cond delay="0"/>
+                                          </p:stCondLst>
+                                        </p:cTn>
+                                        <p:tgtEl>
+                                          <p:spTgt spid="9"/>
+                                        </p:tgtEl>
+                                        <p:attrNameLst>
+                                          <p:attrName>style.visibility</p:attrName>
+                                        </p:attrNameLst>
+                                      </p:cBhvr>
+                                      <p:to>
+                                        <p:strVal val="visible"/>
+                                      </p:to>
+                                    </p:set>
+                                    <p:animEffect transition="in" filter="wipe(up)">
+                                      <p:cBhvr>
+                                        <p:cTn id="32" dur="500"/>
+                                        <p:tgtEl>
+                                          <p:spTgt spid="9"/>
+                                        </p:tgtEl>
+                                      </p:cBhvr>
+                                    </p:animEffect>
+                                  </p:childTnLst>
+                                </p:cTn>
+                              </p:par>
+                              <p:par>
+                                <p:cTn id="33" presetID="22" presetClass="entr" presetSubtype="1" fill="hold" grpId="0" nodeType="withEffect">
+                                  <p:stCondLst>
+                                    <p:cond delay="0"/>
+                                  </p:stCondLst>
+                                  <p:childTnLst>
+                                    <p:set>
+                                      <p:cBhvr>
+                                        <p:cTn id="34" dur="1" fill="hold">
+                                          <p:stCondLst>
+                                            <p:cond delay="0"/>
+                                          </p:stCondLst>
+                                        </p:cTn>
+                                        <p:tgtEl>
+                                          <p:spTgt spid="10"/>
+                                        </p:tgtEl>
+                                        <p:attrNameLst>
+                                          <p:attrName>style.visibility</p:attrName>
+                                        </p:attrNameLst>
+                                      </p:cBhvr>
+                                      <p:to>
+                                        <p:strVal val="visible"/>
+                                      </p:to>
+                                    </p:set>
+                                    <p:animEffect transition="in" filter="wipe(up)">
+                                      <p:cBhvr>
+                                        <p:cTn id="35" dur="500"/>
+                                        <p:tgtEl>
+                                          <p:spTgt spid="10"/>
+                                        </p:tgtEl>
+                                      </p:cBhvr>
+                                    </p:animEffect>
+                                  </p:childTnLst>
+                                </p:cTn>
+                              </p:par>
+                            </p:childTnLst>
+                          </p:cTn>
+                        </p:par>
+                      </p:childTnLst>
+                    </p:cTn>
+                  </p:par>
+                  <p:par>
+                    <p:cTn id="36" fill="hold">
+                      <p:stCondLst>
+                        <p:cond delay="indefinite"/>
+                      </p:stCondLst>
+                      <p:childTnLst>
+                        <p:par>
+                          <p:cTn id="37" fill="hold">
+                            <p:stCondLst>
+                              <p:cond delay="0"/>
+                            </p:stCondLst>
+                            <p:childTnLst>
+                              <p:par>
+                                <p:cTn id="38" presetID="9" presetClass="entr" presetSubtype="0" fill="hold" grpId="0" nodeType="clickEffect">
+                                  <p:stCondLst>
+                                    <p:cond delay="0"/>
+                                  </p:stCondLst>
+                                  <p:childTnLst>
+                                    <p:set>
+                                      <p:cBhvr>
+                                        <p:cTn id="39" dur="1" fill="hold">
                                           <p:stCondLst>
                                             <p:cond delay="0"/>
                                           </p:stCondLst>
@@ -45385,7 +45802,7 @@
                                         <p:tgtEl>
                                           <p:spTgt spid="8">
                                             <p:txEl>
-                                              <p:pRg st="5" end="5"/>
+                                              <p:pRg st="6" end="6"/>
                                             </p:txEl>
                                           </p:spTgt>
                                         </p:tgtEl>
@@ -45399,11 +45816,54 @@
                                     </p:set>
                                     <p:animEffect transition="in" filter="dissolve">
                                       <p:cBhvr>
-                                        <p:cTn id="21" dur="500"/>
+                                        <p:cTn id="40" dur="500"/>
                                         <p:tgtEl>
                                           <p:spTgt spid="8">
                                             <p:txEl>
-                                              <p:pRg st="5" end="5"/>
+                                              <p:pRg st="6" end="6"/>
+                                            </p:txEl>
+                                          </p:spTgt>
+                                        </p:tgtEl>
+                                      </p:cBhvr>
+                                    </p:animEffect>
+                                  </p:childTnLst>
+                                </p:cTn>
+                              </p:par>
+                              <p:par>
+                                <p:cTn id="41" presetID="9" presetClass="entr" presetSubtype="0" fill="hold" grpId="0" nodeType="withEffect">
+                                  <p:stCondLst>
+                                    <p:cond delay="0"/>
+                                  </p:stCondLst>
+                                  <p:childTnLst>
+                                    <p:set>
+                                      <p:cBhvr>
+                                        <p:cTn id="42" dur="1" fill="hold">
+                                          <p:stCondLst>
+                                            <p:cond delay="0"/>
+                                          </p:stCondLst>
+                                        </p:cTn>
+                                        <p:tgtEl>
+                                          <p:spTgt spid="8">
+                                            <p:txEl>
+                                              <p:pRg st="7" end="7"/>
+                                            </p:txEl>
+                                          </p:spTgt>
+                                        </p:tgtEl>
+                                        <p:attrNameLst>
+                                          <p:attrName>style.visibility</p:attrName>
+                                        </p:attrNameLst>
+                                      </p:cBhvr>
+                                      <p:to>
+                                        <p:strVal val="visible"/>
+                                      </p:to>
+                                    </p:set>
+                                    <p:animEffect transition="in" filter="dissolve">
+                                      <p:cBhvr>
+                                        <p:cTn id="43" dur="500"/>
+                                        <p:tgtEl>
+                                          <p:spTgt spid="8">
+                                            <p:txEl>
+                                              <p:pRg st="7" end="7"/>
                                             </p:txEl>
                                           </p:spTgt>
                                         </p:tgtEl>
@@ -45441,6 +45901,10 @@
     </p:tnLst>
     <p:bldLst>
       <p:bldP spid="8" grpId="0" uiExpand="1" build="p"/>
+      <p:bldP spid="3" grpId="0" animBg="1"/>
+      <p:bldP spid="4" grpId="0"/>
+      <p:bldP spid="9" grpId="0" animBg="1"/>
+      <p:bldP spid="10" grpId="0"/>
     </p:bldLst>
   </p:timing>
 </p:sld>

</xml_diff>